<commit_message>
Editando apresentação e incluindo PDF
</commit_message>
<xml_diff>
--- a/ApresentaçãoBigData.pptx
+++ b/ApresentaçãoBigData.pptx
@@ -4545,7 +4545,7 @@
               </a:lnSpc>
             </a:pPr>
             <a:r>
-              <a:rPr lang="pt-BR" sz="2800" b="1" spc="-1" dirty="0" smtClean="0">
+              <a:rPr lang="pt-BR" sz="2800" b="1" spc="-1" dirty="0">
                 <a:solidFill>
                   <a:srgbClr val="546E7A"/>
                 </a:solidFill>
@@ -5044,29 +5044,7 @@
                 <a:ea typeface="Open Sans" panose="020B0606030504020204" pitchFamily="34" charset="0"/>
                 <a:cs typeface="Open Sans" panose="020B0606030504020204" pitchFamily="34" charset="0"/>
               </a:rPr>
-              <a:t>O desenvolvimento </a:t>
-            </a:r>
-            <a:r>
-              <a:rPr lang="pt-BR" sz="2800" b="0" strike="noStrike" spc="-1" dirty="0" smtClean="0">
-                <a:solidFill>
-                  <a:srgbClr val="000000"/>
-                </a:solidFill>
-                <a:latin typeface="Open Sans" panose="020B0606030504020204" pitchFamily="34" charset="0"/>
-                <a:ea typeface="Open Sans" panose="020B0606030504020204" pitchFamily="34" charset="0"/>
-                <a:cs typeface="Open Sans" panose="020B0606030504020204" pitchFamily="34" charset="0"/>
-              </a:rPr>
-              <a:t>deste </a:t>
-            </a:r>
-            <a:r>
-              <a:rPr lang="pt-BR" sz="2800" b="0" strike="noStrike" spc="-1" dirty="0">
-                <a:solidFill>
-                  <a:srgbClr val="000000"/>
-                </a:solidFill>
-                <a:latin typeface="Open Sans" panose="020B0606030504020204" pitchFamily="34" charset="0"/>
-                <a:ea typeface="Open Sans" panose="020B0606030504020204" pitchFamily="34" charset="0"/>
-                <a:cs typeface="Open Sans" panose="020B0606030504020204" pitchFamily="34" charset="0"/>
-              </a:rPr>
-              <a:t>trabalho é baseado no uso de Big data na </a:t>
+              <a:t>O desenvolvimento deste trabalho é baseado no uso de Big data na </a:t>
             </a:r>
             <a:r>
               <a:rPr lang="pt-BR" sz="2800" b="1" strike="noStrike" spc="-1" dirty="0">
@@ -5077,10 +5055,21 @@
                 <a:ea typeface="Open Sans" panose="020B0606030504020204" pitchFamily="34" charset="0"/>
                 <a:cs typeface="Open Sans" panose="020B0606030504020204" pitchFamily="34" charset="0"/>
               </a:rPr>
-              <a:t>tomada de decisão com maior</a:t>
+              <a:t>tomada de decisão com </a:t>
             </a:r>
             <a:r>
-              <a:rPr lang="pt-BR" sz="2800" b="0" strike="noStrike" spc="-1" dirty="0">
+              <a:rPr lang="pt-BR" sz="2800" b="1" strike="noStrike" spc="-1">
+                <a:solidFill>
+                  <a:srgbClr val="000000"/>
+                </a:solidFill>
+                <a:latin typeface="Open Sans" panose="020B0606030504020204" pitchFamily="34" charset="0"/>
+                <a:ea typeface="Open Sans" panose="020B0606030504020204" pitchFamily="34" charset="0"/>
+                <a:cs typeface="Open Sans" panose="020B0606030504020204" pitchFamily="34" charset="0"/>
+              </a:rPr>
+              <a:t>maior</a:t>
+            </a:r>
+            <a:r>
+              <a:rPr lang="pt-BR" sz="2800" b="0" strike="noStrike" spc="-1">
                 <a:solidFill>
                   <a:srgbClr val="000000"/>
                 </a:solidFill>
@@ -5091,7 +5080,7 @@
               <a:t> </a:t>
             </a:r>
             <a:r>
-              <a:rPr lang="pt-BR" sz="2800" b="1" strike="noStrike" spc="-1" dirty="0">
+              <a:rPr lang="pt-BR" sz="2800" b="1" strike="noStrike" spc="-1">
                 <a:solidFill>
                   <a:srgbClr val="FF0000"/>
                 </a:solidFill>
@@ -5099,10 +5088,10 @@
                 <a:ea typeface="Open Sans" panose="020B0606030504020204" pitchFamily="34" charset="0"/>
                 <a:cs typeface="Open Sans" panose="020B0606030504020204" pitchFamily="34" charset="0"/>
               </a:rPr>
-              <a:t>velocidade</a:t>
+              <a:t>quantidade</a:t>
             </a:r>
             <a:r>
-              <a:rPr lang="pt-BR" sz="2800" b="0" strike="noStrike" spc="-1" dirty="0">
+              <a:rPr lang="pt-BR" sz="2800" b="0" strike="noStrike" spc="-1">
                 <a:solidFill>
                   <a:srgbClr val="FF0000"/>
                 </a:solidFill>
@@ -5443,19 +5432,10 @@
                   </a:solidFill>
                   <a:latin typeface="Calibri"/>
                 </a:rPr>
-                <a:t>incrustação </a:t>
+                <a:t>incrustação (</a:t>
               </a:r>
               <a:r>
-                <a:rPr lang="pt-BR" spc="-1" dirty="0" smtClean="0">
-                  <a:solidFill>
-                    <a:srgbClr val="000000"/>
-                  </a:solidFill>
-                  <a:latin typeface="Calibri"/>
-                </a:rPr>
-                <a:t>(</a:t>
-              </a:r>
-              <a:r>
-                <a:rPr lang="pt-BR" spc="-1" dirty="0" err="1" smtClean="0">
+                <a:rPr lang="pt-BR" spc="-1" dirty="0" err="1">
                   <a:solidFill>
                     <a:srgbClr val="000000"/>
                   </a:solidFill>
@@ -5464,7 +5444,7 @@
                 <a:t>Shakkthivel</a:t>
               </a:r>
               <a:r>
-                <a:rPr lang="pt-BR" spc="-1" dirty="0" smtClean="0">
+                <a:rPr lang="pt-BR" spc="-1" dirty="0">
                   <a:solidFill>
                     <a:srgbClr val="000000"/>
                   </a:solidFill>
@@ -5473,7 +5453,7 @@
                 <a:t> &amp; </a:t>
               </a:r>
               <a:r>
-                <a:rPr lang="pt-BR" spc="-1" dirty="0" err="1" smtClean="0">
+                <a:rPr lang="pt-BR" spc="-1" dirty="0" err="1">
                   <a:solidFill>
                     <a:srgbClr val="000000"/>
                   </a:solidFill>
@@ -5482,7 +5462,7 @@
                 <a:t>Vasudevan</a:t>
               </a:r>
               <a:r>
-                <a:rPr lang="pt-BR" spc="-1" dirty="0" smtClean="0">
+                <a:rPr lang="pt-BR" spc="-1" dirty="0">
                   <a:solidFill>
                     <a:srgbClr val="000000"/>
                   </a:solidFill>
@@ -5619,16 +5599,7 @@
                     </a:solidFill>
                     <a:latin typeface="Calibri"/>
                   </a:rPr>
-                  <a:t>Formação de incrustação em </a:t>
-                </a:r>
-                <a:r>
-                  <a:rPr lang="pt-BR" sz="1800" b="0" strike="noStrike" spc="-1" dirty="0" smtClean="0">
-                    <a:solidFill>
-                      <a:srgbClr val="000000"/>
-                    </a:solidFill>
-                    <a:latin typeface="Calibri"/>
-                  </a:rPr>
-                  <a:t>tubulações (Rocha, 2002)</a:t>
+                  <a:t>Formação de incrustação em tubulações (Rocha, 2002)</a:t>
                 </a:r>
                 <a:endParaRPr lang="pt-BR" sz="1800" b="0" strike="noStrike" spc="-1" dirty="0">
                   <a:latin typeface="Arial"/>
@@ -5813,7 +5784,7 @@
               </a:lnSpc>
             </a:pPr>
             <a:r>
-              <a:rPr lang="pt-BR" sz="2800" b="1" strike="noStrike" spc="-1" dirty="0" smtClean="0">
+              <a:rPr lang="pt-BR" sz="2800" b="1" strike="noStrike" spc="-1" dirty="0">
                 <a:solidFill>
                   <a:srgbClr val="44546A"/>
                 </a:solidFill>
@@ -5902,7 +5873,7 @@
           <a:lstStyle/>
           <a:p>
             <a:r>
-              <a:rPr lang="pt-BR" sz="2800" dirty="0" smtClean="0">
+              <a:rPr lang="pt-BR" sz="2800" dirty="0">
                 <a:solidFill>
                   <a:schemeClr val="bg1"/>
                 </a:solidFill>
@@ -5910,7 +5881,7 @@
               <a:t>Tempo</a:t>
             </a:r>
             <a:r>
-              <a:rPr lang="pt-BR" dirty="0" smtClean="0">
+              <a:rPr lang="pt-BR" dirty="0">
                 <a:solidFill>
                   <a:schemeClr val="bg1"/>
                 </a:solidFill>
@@ -6140,7 +6111,7 @@
               </a:lnSpc>
             </a:pPr>
             <a:r>
-              <a:rPr lang="pt-BR" sz="2800" b="1" strike="noStrike" spc="-1" dirty="0" smtClean="0">
+              <a:rPr lang="pt-BR" sz="2800" b="1" strike="noStrike" spc="-1" dirty="0">
                 <a:solidFill>
                   <a:srgbClr val="000000"/>
                 </a:solidFill>
@@ -6151,7 +6122,7 @@
               <a:t>Alunos</a:t>
             </a:r>
             <a:r>
-              <a:rPr lang="pt-BR" sz="2800" b="0" strike="noStrike" spc="-1" dirty="0" smtClean="0">
+              <a:rPr lang="pt-BR" sz="2800" b="0" strike="noStrike" spc="-1" dirty="0">
                 <a:solidFill>
                   <a:srgbClr val="000000"/>
                 </a:solidFill>
@@ -6168,7 +6139,7 @@
               <a:buChar char="•"/>
             </a:pPr>
             <a:r>
-              <a:rPr lang="pt-BR" sz="2800" spc="-1" dirty="0" smtClean="0">
+              <a:rPr lang="pt-BR" sz="2800" spc="-1" dirty="0">
                 <a:solidFill>
                   <a:srgbClr val="000000"/>
                 </a:solidFill>
@@ -6178,14 +6149,6 @@
               </a:rPr>
               <a:t>Andreza Moreira</a:t>
             </a:r>
-            <a:endParaRPr lang="pt-BR" sz="2800" spc="-1" dirty="0">
-              <a:solidFill>
-                <a:srgbClr val="000000"/>
-              </a:solidFill>
-              <a:latin typeface="Open Sans" panose="020B0606030504020204" pitchFamily="34" charset="0"/>
-              <a:ea typeface="Open Sans" panose="020B0606030504020204" pitchFamily="34" charset="0"/>
-              <a:cs typeface="Open Sans" panose="020B0606030504020204" pitchFamily="34" charset="0"/>
-            </a:endParaRPr>
           </a:p>
           <a:p>
             <a:pPr marL="914400" lvl="1" indent="-457200" algn="just">
@@ -6193,7 +6156,7 @@
               <a:buChar char="•"/>
             </a:pPr>
             <a:r>
-              <a:rPr lang="pt-BR" sz="2800" spc="-1" dirty="0" smtClean="0">
+              <a:rPr lang="pt-BR" sz="2800" spc="-1" dirty="0">
                 <a:solidFill>
                   <a:srgbClr val="000000"/>
                 </a:solidFill>
@@ -6203,14 +6166,6 @@
               </a:rPr>
               <a:t>Gabriela Menezes</a:t>
             </a:r>
-            <a:endParaRPr lang="pt-BR" sz="2800" spc="-1" dirty="0" smtClean="0">
-              <a:solidFill>
-                <a:srgbClr val="000000"/>
-              </a:solidFill>
-              <a:latin typeface="Open Sans" panose="020B0606030504020204" pitchFamily="34" charset="0"/>
-              <a:ea typeface="Open Sans" panose="020B0606030504020204" pitchFamily="34" charset="0"/>
-              <a:cs typeface="Open Sans" panose="020B0606030504020204" pitchFamily="34" charset="0"/>
-            </a:endParaRPr>
           </a:p>
           <a:p>
             <a:pPr marL="914400" lvl="1" indent="-457200" algn="just">
@@ -6218,7 +6173,7 @@
               <a:buChar char="•"/>
             </a:pPr>
             <a:r>
-              <a:rPr lang="pt-BR" sz="2800" spc="-1" dirty="0" smtClean="0">
+              <a:rPr lang="pt-BR" sz="2800" spc="-1" dirty="0">
                 <a:solidFill>
                   <a:srgbClr val="000000"/>
                 </a:solidFill>
@@ -6235,7 +6190,7 @@
               <a:buChar char="•"/>
             </a:pPr>
             <a:r>
-              <a:rPr lang="pt-BR" sz="2800" spc="-1" dirty="0" smtClean="0">
+              <a:rPr lang="pt-BR" sz="2800" spc="-1" dirty="0">
                 <a:solidFill>
                   <a:srgbClr val="000000"/>
                 </a:solidFill>
@@ -6252,7 +6207,7 @@
               <a:buChar char="•"/>
             </a:pPr>
             <a:r>
-              <a:rPr lang="pt-BR" sz="2800" spc="-1" dirty="0" smtClean="0">
+              <a:rPr lang="pt-BR" sz="2800" spc="-1" dirty="0">
                 <a:solidFill>
                   <a:srgbClr val="000000"/>
                 </a:solidFill>
@@ -6262,14 +6217,6 @@
               </a:rPr>
               <a:t>Wagner Souza</a:t>
             </a:r>
-            <a:endParaRPr lang="pt-BR" sz="2800" spc="-1" dirty="0" smtClean="0">
-              <a:solidFill>
-                <a:srgbClr val="000000"/>
-              </a:solidFill>
-              <a:latin typeface="Open Sans" panose="020B0606030504020204" pitchFamily="34" charset="0"/>
-              <a:ea typeface="Open Sans" panose="020B0606030504020204" pitchFamily="34" charset="0"/>
-              <a:cs typeface="Open Sans" panose="020B0606030504020204" pitchFamily="34" charset="0"/>
-            </a:endParaRPr>
           </a:p>
           <a:p>
             <a:pPr marL="914400" lvl="1" indent="-457200" algn="just">
@@ -6277,7 +6224,7 @@
               <a:buChar char="•"/>
             </a:pPr>
             <a:r>
-              <a:rPr lang="pt-BR" sz="2800" spc="-1" dirty="0" err="1" smtClean="0">
+              <a:rPr lang="pt-BR" sz="2800" spc="-1" dirty="0" err="1">
                 <a:solidFill>
                   <a:srgbClr val="000000"/>
                 </a:solidFill>
@@ -6288,7 +6235,7 @@
               <a:t>Tayline</a:t>
             </a:r>
             <a:r>
-              <a:rPr lang="pt-BR" sz="2800" spc="-1" dirty="0" smtClean="0">
+              <a:rPr lang="pt-BR" sz="2800" spc="-1" dirty="0">
                 <a:solidFill>
                   <a:srgbClr val="000000"/>
                 </a:solidFill>
@@ -6298,14 +6245,6 @@
               </a:rPr>
               <a:t> Amaral</a:t>
             </a:r>
-            <a:endParaRPr lang="pt-BR" sz="2800" spc="-1" dirty="0" smtClean="0">
-              <a:solidFill>
-                <a:srgbClr val="000000"/>
-              </a:solidFill>
-              <a:latin typeface="Open Sans" panose="020B0606030504020204" pitchFamily="34" charset="0"/>
-              <a:ea typeface="Open Sans" panose="020B0606030504020204" pitchFamily="34" charset="0"/>
-              <a:cs typeface="Open Sans" panose="020B0606030504020204" pitchFamily="34" charset="0"/>
-            </a:endParaRPr>
           </a:p>
           <a:p>
             <a:pPr marL="914400" lvl="1" indent="-457200" algn="just">
@@ -6313,7 +6252,7 @@
               <a:buChar char="•"/>
             </a:pPr>
             <a:r>
-              <a:rPr lang="pt-BR" sz="2800" spc="-1" dirty="0" smtClean="0">
+              <a:rPr lang="pt-BR" sz="2800" spc="-1" dirty="0">
                 <a:solidFill>
                   <a:srgbClr val="000000"/>
                 </a:solidFill>
@@ -6323,14 +6262,6 @@
               </a:rPr>
               <a:t>Yasmin Pereira</a:t>
             </a:r>
-            <a:endParaRPr lang="pt-BR" sz="2800" spc="-1" dirty="0" smtClean="0">
-              <a:solidFill>
-                <a:srgbClr val="000000"/>
-              </a:solidFill>
-              <a:latin typeface="Open Sans" panose="020B0606030504020204" pitchFamily="34" charset="0"/>
-              <a:ea typeface="Open Sans" panose="020B0606030504020204" pitchFamily="34" charset="0"/>
-              <a:cs typeface="Open Sans" panose="020B0606030504020204" pitchFamily="34" charset="0"/>
-            </a:endParaRPr>
           </a:p>
           <a:p>
             <a:pPr algn="just">
@@ -6339,7 +6270,7 @@
               </a:lnSpc>
             </a:pPr>
             <a:r>
-              <a:rPr lang="pt-BR" sz="2800" b="1" strike="noStrike" spc="-1" dirty="0" smtClean="0">
+              <a:rPr lang="pt-BR" sz="2800" b="1" strike="noStrike" spc="-1" dirty="0">
                 <a:solidFill>
                   <a:srgbClr val="000000"/>
                 </a:solidFill>
@@ -6350,7 +6281,7 @@
               <a:t>Professor</a:t>
             </a:r>
             <a:r>
-              <a:rPr lang="pt-BR" sz="2800" b="0" strike="noStrike" spc="-1" dirty="0" smtClean="0">
+              <a:rPr lang="pt-BR" sz="2800" b="0" strike="noStrike" spc="-1" dirty="0">
                 <a:solidFill>
                   <a:srgbClr val="000000"/>
                 </a:solidFill>
@@ -6374,7 +6305,7 @@
               </a:rPr>
               <a:t>Alexandre de Assis Bento Lima  </a:t>
             </a:r>
-            <a:endParaRPr lang="pt-BR" sz="2800" b="0" strike="noStrike" spc="-1" dirty="0" smtClean="0">
+            <a:endParaRPr lang="pt-BR" sz="2800" b="0" strike="noStrike" spc="-1" dirty="0">
               <a:solidFill>
                 <a:srgbClr val="000000"/>
               </a:solidFill>
@@ -6483,7 +6414,7 @@
               </a:lnSpc>
             </a:pPr>
             <a:r>
-              <a:rPr lang="pt-BR" sz="2800" b="1" strike="noStrike" spc="-1" dirty="0" smtClean="0">
+              <a:rPr lang="pt-BR" sz="2800" b="1" strike="noStrike" spc="-1" dirty="0">
                 <a:solidFill>
                   <a:srgbClr val="44546A"/>
                 </a:solidFill>
@@ -6550,12 +6481,6 @@
               </a:rPr>
               <a:t>Rocha, A. A.; Tese de Doutorado, Pontifícia Universidade Católica do Rio de Janeiro, Brasil, 2002.</a:t>
             </a:r>
-            <a:endParaRPr lang="pt-BR" spc="-1" dirty="0" smtClean="0">
-              <a:solidFill>
-                <a:srgbClr val="000000"/>
-              </a:solidFill>
-              <a:latin typeface="Calibri"/>
-            </a:endParaRPr>
           </a:p>
           <a:p>
             <a:pPr algn="just">
@@ -6563,7 +6488,7 @@
                 <a:spcPct val="100000"/>
               </a:lnSpc>
             </a:pPr>
-            <a:endParaRPr lang="pt-BR" spc="-1" dirty="0" smtClean="0">
+            <a:endParaRPr lang="pt-BR" spc="-1" dirty="0">
               <a:solidFill>
                 <a:srgbClr val="000000"/>
               </a:solidFill>
@@ -6577,7 +6502,7 @@
               </a:lnSpc>
             </a:pPr>
             <a:r>
-              <a:rPr lang="pt-BR" spc="-1" dirty="0" err="1" smtClean="0">
+              <a:rPr lang="pt-BR" spc="-1" dirty="0" err="1">
                 <a:solidFill>
                   <a:srgbClr val="000000"/>
                 </a:solidFill>
@@ -6628,16 +6553,7 @@
                 </a:solidFill>
                 <a:latin typeface="Calibri"/>
               </a:rPr>
-              <a:t> 2006, 197, 179</a:t>
-            </a:r>
-            <a:r>
-              <a:rPr lang="pt-BR" spc="-1" dirty="0" smtClean="0">
-                <a:solidFill>
-                  <a:srgbClr val="000000"/>
-                </a:solidFill>
-                <a:latin typeface="Calibri"/>
-              </a:rPr>
-              <a:t>.</a:t>
+              <a:t> 2006, 197, 179.</a:t>
             </a:r>
           </a:p>
           <a:p>
@@ -6659,7 +6575,7 @@
                 <a:spcPct val="100000"/>
               </a:lnSpc>
             </a:pPr>
-            <a:endParaRPr lang="pt-BR" spc="-1" dirty="0" smtClean="0">
+            <a:endParaRPr lang="pt-BR" spc="-1" dirty="0">
               <a:solidFill>
                 <a:srgbClr val="000000"/>
               </a:solidFill>
@@ -6685,7 +6601,7 @@
                 <a:spcPct val="100000"/>
               </a:lnSpc>
             </a:pPr>
-            <a:endParaRPr lang="pt-BR" spc="-1" dirty="0" smtClean="0">
+            <a:endParaRPr lang="pt-BR" spc="-1" dirty="0">
               <a:solidFill>
                 <a:srgbClr val="000000"/>
               </a:solidFill>
@@ -6808,7 +6724,7 @@
               </a:lnSpc>
             </a:pPr>
             <a:r>
-              <a:rPr lang="pt-BR" sz="2800" b="1" spc="-1" dirty="0" smtClean="0">
+              <a:rPr lang="pt-BR" sz="2800" b="1" spc="-1" dirty="0">
                 <a:solidFill>
                   <a:srgbClr val="44546A"/>
                 </a:solidFill>
@@ -6819,7 +6735,7 @@
               <a:t>Endereço do </a:t>
             </a:r>
             <a:r>
-              <a:rPr lang="pt-BR" sz="2800" b="1" spc="-1" dirty="0" err="1" smtClean="0">
+              <a:rPr lang="pt-BR" sz="2800" b="1" spc="-1" dirty="0" err="1">
                 <a:solidFill>
                   <a:srgbClr val="44546A"/>
                 </a:solidFill>

</xml_diff>